<commit_message>
Projeto atualizado ultima entrega
</commit_message>
<xml_diff>
--- a/4a entrega/apresentacao_ideation.pptx
+++ b/4a entrega/apresentacao_ideation.pptx
@@ -10,8 +10,8 @@
   <p:sldIdLst>
     <p:sldId id="256" r:id="rId2"/>
     <p:sldId id="257" r:id="rId3"/>
-    <p:sldId id="259" r:id="rId4"/>
-    <p:sldId id="258" r:id="rId5"/>
+    <p:sldId id="260" r:id="rId4"/>
+    <p:sldId id="259" r:id="rId5"/>
   </p:sldIdLst>
   <p:sldSz cx="12192000" cy="6858000"/>
   <p:notesSz cx="6858000" cy="9144000"/>
@@ -200,7 +200,7 @@
           <a:p>
             <a:fld id="{13CF749D-790B-4E4E-AB74-79A022DE2003}" type="datetimeFigureOut">
               <a:rPr lang="pt-PT" smtClean="0"/>
-              <a:t>18/05/2020</a:t>
+              <a:t>26/06/2020</a:t>
             </a:fld>
             <a:endParaRPr lang="pt-PT"/>
           </a:p>
@@ -511,7 +511,10 @@
           <a:bodyPr/>
           <a:lstStyle/>
           <a:p>
-            <a:endParaRPr lang="pt-PT" dirty="0"/>
+            <a:r>
+              <a:rPr lang="pt-PT" dirty="0"/>
+              <a:t>Falar coisas de não se poderem encontrar presencialmente e facilitar a vida deles e tornar mais produtivo CONTEXTO E AMBITO  FALAR DE Concorrentes</a:t>
+            </a:r>
           </a:p>
         </p:txBody>
       </p:sp>
@@ -595,6 +598,18 @@
           <a:bodyPr/>
           <a:lstStyle/>
           <a:p>
+            <a:r>
+              <a:rPr lang="pt-PT" dirty="0" err="1"/>
+              <a:t>Etica</a:t>
+            </a:r>
+            <a:r>
+              <a:rPr lang="pt-PT" dirty="0"/>
+              <a:t> </a:t>
+            </a:r>
+            <a:r>
+              <a:rPr lang="pt-PT" dirty="0" err="1"/>
+              <a:t>stakewhodlers</a:t>
+            </a:r>
             <a:endParaRPr lang="pt-PT" dirty="0"/>
           </a:p>
         </p:txBody>
@@ -625,7 +640,7 @@
     </p:spTree>
     <p:extLst>
       <p:ext uri="{BB962C8B-B14F-4D97-AF65-F5344CB8AC3E}">
-        <p14:creationId xmlns:p14="http://schemas.microsoft.com/office/powerpoint/2010/main" val="3569452599"/>
+        <p14:creationId xmlns:p14="http://schemas.microsoft.com/office/powerpoint/2010/main" val="143638872"/>
       </p:ext>
     </p:extLst>
   </p:cSld>
@@ -861,7 +876,7 @@
           <a:p>
             <a:fld id="{F588D417-AEDC-467B-ACB0-BBE99331DB28}" type="datetimeFigureOut">
               <a:rPr lang="pt-PT" smtClean="0"/>
-              <a:t>18/05/2020</a:t>
+              <a:t>26/06/2020</a:t>
             </a:fld>
             <a:endParaRPr lang="pt-PT"/>
           </a:p>
@@ -1069,7 +1084,7 @@
           <a:p>
             <a:fld id="{F588D417-AEDC-467B-ACB0-BBE99331DB28}" type="datetimeFigureOut">
               <a:rPr lang="pt-PT" smtClean="0"/>
-              <a:t>18/05/2020</a:t>
+              <a:t>26/06/2020</a:t>
             </a:fld>
             <a:endParaRPr lang="pt-PT"/>
           </a:p>
@@ -1325,7 +1340,7 @@
           <a:p>
             <a:fld id="{F588D417-AEDC-467B-ACB0-BBE99331DB28}" type="datetimeFigureOut">
               <a:rPr lang="pt-PT" smtClean="0"/>
-              <a:t>18/05/2020</a:t>
+              <a:t>26/06/2020</a:t>
             </a:fld>
             <a:endParaRPr lang="pt-PT"/>
           </a:p>
@@ -1499,7 +1514,7 @@
           <a:p>
             <a:fld id="{F588D417-AEDC-467B-ACB0-BBE99331DB28}" type="datetimeFigureOut">
               <a:rPr lang="pt-PT" smtClean="0"/>
-              <a:t>18/05/2020</a:t>
+              <a:t>26/06/2020</a:t>
             </a:fld>
             <a:endParaRPr lang="pt-PT"/>
           </a:p>
@@ -1842,7 +1857,7 @@
           <a:p>
             <a:fld id="{F588D417-AEDC-467B-ACB0-BBE99331DB28}" type="datetimeFigureOut">
               <a:rPr lang="pt-PT" smtClean="0"/>
-              <a:t>18/05/2020</a:t>
+              <a:t>26/06/2020</a:t>
             </a:fld>
             <a:endParaRPr lang="pt-PT"/>
           </a:p>
@@ -2117,7 +2132,7 @@
           <a:p>
             <a:fld id="{F588D417-AEDC-467B-ACB0-BBE99331DB28}" type="datetimeFigureOut">
               <a:rPr lang="pt-PT" smtClean="0"/>
-              <a:t>18/05/2020</a:t>
+              <a:t>26/06/2020</a:t>
             </a:fld>
             <a:endParaRPr lang="pt-PT"/>
           </a:p>
@@ -2496,7 +2511,7 @@
           <a:p>
             <a:fld id="{F588D417-AEDC-467B-ACB0-BBE99331DB28}" type="datetimeFigureOut">
               <a:rPr lang="pt-PT" smtClean="0"/>
-              <a:t>18/05/2020</a:t>
+              <a:t>26/06/2020</a:t>
             </a:fld>
             <a:endParaRPr lang="pt-PT"/>
           </a:p>
@@ -2614,7 +2629,7 @@
           <a:p>
             <a:fld id="{F588D417-AEDC-467B-ACB0-BBE99331DB28}" type="datetimeFigureOut">
               <a:rPr lang="pt-PT" smtClean="0"/>
-              <a:t>18/05/2020</a:t>
+              <a:t>26/06/2020</a:t>
             </a:fld>
             <a:endParaRPr lang="pt-PT"/>
           </a:p>
@@ -2785,7 +2800,7 @@
           <a:p>
             <a:fld id="{F588D417-AEDC-467B-ACB0-BBE99331DB28}" type="datetimeFigureOut">
               <a:rPr lang="pt-PT" smtClean="0"/>
-              <a:t>18/05/2020</a:t>
+              <a:t>26/06/2020</a:t>
             </a:fld>
             <a:endParaRPr lang="pt-PT"/>
           </a:p>
@@ -3139,7 +3154,7 @@
           <a:p>
             <a:fld id="{F588D417-AEDC-467B-ACB0-BBE99331DB28}" type="datetimeFigureOut">
               <a:rPr lang="pt-PT" smtClean="0"/>
-              <a:t>18/05/2020</a:t>
+              <a:t>26/06/2020</a:t>
             </a:fld>
             <a:endParaRPr lang="pt-PT"/>
           </a:p>
@@ -3521,7 +3536,7 @@
           <a:p>
             <a:fld id="{F588D417-AEDC-467B-ACB0-BBE99331DB28}" type="datetimeFigureOut">
               <a:rPr lang="pt-PT" smtClean="0"/>
-              <a:t>18/05/2020</a:t>
+              <a:t>26/06/2020</a:t>
             </a:fld>
             <a:endParaRPr lang="pt-PT"/>
           </a:p>
@@ -3808,7 +3823,7 @@
           <a:p>
             <a:fld id="{F588D417-AEDC-467B-ACB0-BBE99331DB28}" type="datetimeFigureOut">
               <a:rPr lang="pt-PT" smtClean="0"/>
-              <a:t>18/05/2020</a:t>
+              <a:t>26/06/2020</a:t>
             </a:fld>
             <a:endParaRPr lang="pt-PT"/>
           </a:p>
@@ -4409,8 +4424,8 @@
                 <a:solidFill>
                   <a:schemeClr val="tx1"/>
                 </a:solidFill>
-                <a:latin typeface="Arial" panose="020B0604020202020204" pitchFamily="34" charset="0"/>
-                <a:cs typeface="Arial" panose="020B0604020202020204" pitchFamily="34" charset="0"/>
+                <a:latin typeface="Times New Roman" panose="02020603050405020304" pitchFamily="18" charset="0"/>
+                <a:cs typeface="Times New Roman" panose="02020603050405020304" pitchFamily="18" charset="0"/>
               </a:rPr>
               <a:t>Mobile </a:t>
             </a:r>
@@ -4419,8 +4434,8 @@
                 <a:solidFill>
                   <a:schemeClr val="tx1"/>
                 </a:solidFill>
-                <a:latin typeface="Arial" panose="020B0604020202020204" pitchFamily="34" charset="0"/>
-                <a:cs typeface="Arial" panose="020B0604020202020204" pitchFamily="34" charset="0"/>
+                <a:latin typeface="Times New Roman" panose="02020603050405020304" pitchFamily="18" charset="0"/>
+                <a:cs typeface="Times New Roman" panose="02020603050405020304" pitchFamily="18" charset="0"/>
               </a:rPr>
               <a:t>Ideation</a:t>
             </a:r>
@@ -4428,8 +4443,8 @@
               <a:solidFill>
                 <a:schemeClr val="tx1"/>
               </a:solidFill>
-              <a:latin typeface="Arial" panose="020B0604020202020204" pitchFamily="34" charset="0"/>
-              <a:cs typeface="Arial" panose="020B0604020202020204" pitchFamily="34" charset="0"/>
+              <a:latin typeface="Times New Roman" panose="02020603050405020304" pitchFamily="18" charset="0"/>
+              <a:cs typeface="Times New Roman" panose="02020603050405020304" pitchFamily="18" charset="0"/>
             </a:endParaRPr>
           </a:p>
         </p:txBody>
@@ -4467,6 +4482,8 @@
                 <a:solidFill>
                   <a:schemeClr val="tx1"/>
                 </a:solidFill>
+                <a:latin typeface="Times New Roman" panose="02020603050405020304" pitchFamily="18" charset="0"/>
+                <a:cs typeface="Times New Roman" panose="02020603050405020304" pitchFamily="18" charset="0"/>
               </a:rPr>
               <a:t>Engenharia Informática </a:t>
             </a:r>
@@ -4477,6 +4494,8 @@
                 <a:solidFill>
                   <a:schemeClr val="tx1"/>
                 </a:solidFill>
+                <a:latin typeface="Times New Roman" panose="02020603050405020304" pitchFamily="18" charset="0"/>
+                <a:cs typeface="Times New Roman" panose="02020603050405020304" pitchFamily="18" charset="0"/>
               </a:rPr>
               <a:t>Tomás Santos nº50037589</a:t>
             </a:r>
@@ -4531,11 +4550,11 @@
   <p:clrMapOvr>
     <a:masterClrMapping/>
   </p:clrMapOvr>
-  <mc:AlternateContent xmlns:mc="http://schemas.openxmlformats.org/markup-compatibility/2006">
-    <mc:Choice xmlns:p14="http://schemas.microsoft.com/office/powerpoint/2010/main" Requires="p14">
+  <mc:AlternateContent xmlns:mc="http://schemas.openxmlformats.org/markup-compatibility/2006" xmlns:p14="http://schemas.microsoft.com/office/powerpoint/2010/main">
+    <mc:Choice Requires="p14">
       <p:transition spd="slow" p14:dur="2000" advTm="5644"/>
     </mc:Choice>
-    <mc:Fallback>
+    <mc:Fallback xmlns="">
       <p:transition spd="slow" advTm="5644"/>
     </mc:Fallback>
   </mc:AlternateContent>
@@ -4682,7 +4701,14 @@
                 <a:latin typeface="Arial" panose="020B0604020202020204" pitchFamily="34" charset="0"/>
                 <a:cs typeface="Arial" panose="020B0604020202020204" pitchFamily="34" charset="0"/>
               </a:rPr>
-              <a:t>				Objetivo</a:t>
+              <a:t>				</a:t>
+            </a:r>
+            <a:r>
+              <a:rPr lang="pt-PT" dirty="0">
+                <a:latin typeface="Times New Roman" panose="02020603050405020304" pitchFamily="18" charset="0"/>
+                <a:cs typeface="Times New Roman" panose="02020603050405020304" pitchFamily="18" charset="0"/>
+              </a:rPr>
+              <a:t>Objetivo</a:t>
             </a:r>
           </a:p>
         </p:txBody>
@@ -4721,8 +4747,8 @@
             </a:pPr>
             <a:r>
               <a:rPr lang="pt-PT" dirty="0">
-                <a:latin typeface="Arial" panose="020B0604020202020204" pitchFamily="34" charset="0"/>
-                <a:cs typeface="Arial" panose="020B0604020202020204" pitchFamily="34" charset="0"/>
+                <a:latin typeface="Times New Roman" panose="02020603050405020304" pitchFamily="18" charset="0"/>
+                <a:cs typeface="Times New Roman" panose="02020603050405020304" pitchFamily="18" charset="0"/>
               </a:rPr>
               <a:t>Facilitar a partilha de ideias e feedback entre utilizadores.</a:t>
             </a:r>
@@ -4734,8 +4760,8 @@
             </a:pPr>
             <a:r>
               <a:rPr lang="pt-PT" dirty="0">
-                <a:latin typeface="Arial" panose="020B0604020202020204" pitchFamily="34" charset="0"/>
-                <a:cs typeface="Arial" panose="020B0604020202020204" pitchFamily="34" charset="0"/>
+                <a:latin typeface="Times New Roman" panose="02020603050405020304" pitchFamily="18" charset="0"/>
+                <a:cs typeface="Times New Roman" panose="02020603050405020304" pitchFamily="18" charset="0"/>
               </a:rPr>
               <a:t>Criar ou participar em desafios.</a:t>
             </a:r>
@@ -4747,24 +4773,23 @@
             </a:pPr>
             <a:r>
               <a:rPr lang="pt-PT" dirty="0">
-                <a:latin typeface="Arial" panose="020B0604020202020204" pitchFamily="34" charset="0"/>
-                <a:cs typeface="Arial" panose="020B0604020202020204" pitchFamily="34" charset="0"/>
+                <a:latin typeface="Times New Roman" panose="02020603050405020304" pitchFamily="18" charset="0"/>
+                <a:cs typeface="Times New Roman" panose="02020603050405020304" pitchFamily="18" charset="0"/>
               </a:rPr>
-              <a:t>Plataforma </a:t>
-            </a:r>
-            <a:r>
-              <a:rPr lang="pt-PT" dirty="0" err="1">
-                <a:latin typeface="Arial" panose="020B0604020202020204" pitchFamily="34" charset="0"/>
-                <a:cs typeface="Arial" panose="020B0604020202020204" pitchFamily="34" charset="0"/>
+              <a:t>Receber e Analisar resultados de desafios.</a:t>
+            </a:r>
+          </a:p>
+          <a:p>
+            <a:pPr>
+              <a:buFont typeface="Wingdings" panose="05000000000000000000" pitchFamily="2" charset="2"/>
+              <a:buChar char="q"/>
+            </a:pPr>
+            <a:r>
+              <a:rPr lang="pt-PT" dirty="0">
+                <a:latin typeface="Times New Roman" panose="02020603050405020304" pitchFamily="18" charset="0"/>
+                <a:cs typeface="Times New Roman" panose="02020603050405020304" pitchFamily="18" charset="0"/>
               </a:rPr>
-              <a:t>Gamificada</a:t>
-            </a:r>
-            <a:r>
-              <a:rPr lang="pt-PT" dirty="0">
-                <a:latin typeface="Arial" panose="020B0604020202020204" pitchFamily="34" charset="0"/>
-                <a:cs typeface="Arial" panose="020B0604020202020204" pitchFamily="34" charset="0"/>
-              </a:rPr>
-              <a:t>.</a:t>
+              <a:t>Plataforma Gamificada.</a:t>
             </a:r>
           </a:p>
           <a:p>
@@ -4820,11 +4845,11 @@
   <p:clrMapOvr>
     <a:masterClrMapping/>
   </p:clrMapOvr>
-  <mc:AlternateContent xmlns:mc="http://schemas.openxmlformats.org/markup-compatibility/2006">
-    <mc:Choice xmlns:p14="http://schemas.microsoft.com/office/powerpoint/2010/main" Requires="p14">
+  <mc:AlternateContent xmlns:mc="http://schemas.openxmlformats.org/markup-compatibility/2006" xmlns:p14="http://schemas.microsoft.com/office/powerpoint/2010/main">
+    <mc:Choice Requires="p14">
       <p:transition spd="slow" p14:dur="2000" advTm="21604"/>
     </mc:Choice>
-    <mc:Fallback>
+    <mc:Fallback xmlns="">
       <p:transition spd="slow" advTm="21604"/>
     </mc:Fallback>
   </mc:AlternateContent>
@@ -4940,7 +4965,7 @@
           <p:cNvPr id="2" name="Título 1">
             <a:extLst>
               <a:ext uri="{FF2B5EF4-FFF2-40B4-BE49-F238E27FC236}">
-                <a16:creationId xmlns:a16="http://schemas.microsoft.com/office/drawing/2014/main" id="{DCF06C45-9BB4-409A-8D97-C31A9E8FE8F8}"/>
+                <a16:creationId xmlns:a16="http://schemas.microsoft.com/office/drawing/2014/main" id="{B0119894-5712-4D5B-9D61-C1DC9E769819}"/>
               </a:ext>
             </a:extLst>
           </p:cNvPr>
@@ -4957,18 +4982,21 @@
           <a:lstStyle/>
           <a:p>
             <a:r>
-              <a:rPr lang="pt-PT" dirty="0"/>
-              <a:t>Diagrama de Blocos</a:t>
+              <a:rPr lang="pt-PT" dirty="0">
+                <a:latin typeface="Times New Roman" panose="02020603050405020304" pitchFamily="18" charset="0"/>
+                <a:cs typeface="Times New Roman" panose="02020603050405020304" pitchFamily="18" charset="0"/>
+              </a:rPr>
+              <a:t>Requisitos Funcionais</a:t>
             </a:r>
           </a:p>
         </p:txBody>
       </p:sp>
       <p:pic>
         <p:nvPicPr>
-          <p:cNvPr id="9" name="Marcador de Posição de Conteúdo 8" descr="Uma imagem com texto, mapa&#10;&#10;Descrição gerada automaticamente">
+          <p:cNvPr id="8" name="Marcador de Posição de Conteúdo 7">
             <a:extLst>
               <a:ext uri="{FF2B5EF4-FFF2-40B4-BE49-F238E27FC236}">
-                <a16:creationId xmlns:a16="http://schemas.microsoft.com/office/drawing/2014/main" id="{CE3666C1-93A9-4B7D-9218-1A01D4D5966E}"/>
+                <a16:creationId xmlns:a16="http://schemas.microsoft.com/office/drawing/2014/main" id="{1EF2273F-290E-48C1-BD68-EEB57574FF97}"/>
               </a:ext>
             </a:extLst>
           </p:cNvPr>
@@ -4980,24 +5008,79 @@
           </p:nvPr>
         </p:nvPicPr>
         <p:blipFill>
-          <a:blip r:embed="rId4">
-            <a:extLst>
-              <a:ext uri="{28A0092B-C50C-407E-A947-70E740481C1C}">
-                <a14:useLocalDpi xmlns:a14="http://schemas.microsoft.com/office/drawing/2010/main" val="0"/>
-              </a:ext>
-            </a:extLst>
-          </a:blip>
+          <a:blip r:embed="rId2"/>
           <a:stretch>
             <a:fillRect/>
           </a:stretch>
         </p:blipFill>
         <p:spPr>
           <a:xfrm>
-            <a:off x="2549237" y="1795436"/>
-            <a:ext cx="6757604" cy="4481524"/>
+            <a:off x="2359279" y="1902826"/>
+            <a:ext cx="7473442" cy="3647752"/>
           </a:xfrm>
+          <a:prstGeom prst="rect">
+            <a:avLst/>
+          </a:prstGeom>
         </p:spPr>
       </p:pic>
+    </p:spTree>
+    <p:extLst>
+      <p:ext uri="{BB962C8B-B14F-4D97-AF65-F5344CB8AC3E}">
+        <p14:creationId xmlns:p14="http://schemas.microsoft.com/office/powerpoint/2010/main" val="220642427"/>
+      </p:ext>
+    </p:extLst>
+  </p:cSld>
+  <p:clrMapOvr>
+    <a:masterClrMapping/>
+  </p:clrMapOvr>
+</p:sld>
+</file>
+
+<file path=ppt/slides/slide4.xml><?xml version="1.0" encoding="utf-8"?>
+<p:sld xmlns:a="http://schemas.openxmlformats.org/drawingml/2006/main" xmlns:r="http://schemas.openxmlformats.org/officeDocument/2006/relationships" xmlns:p="http://schemas.openxmlformats.org/presentationml/2006/main">
+  <p:cSld>
+    <p:spTree>
+      <p:nvGrpSpPr>
+        <p:cNvPr id="1" name=""/>
+        <p:cNvGrpSpPr/>
+        <p:nvPr/>
+      </p:nvGrpSpPr>
+      <p:grpSpPr>
+        <a:xfrm>
+          <a:off x="0" y="0"/>
+          <a:ext cx="0" cy="0"/>
+          <a:chOff x="0" y="0"/>
+          <a:chExt cx="0" cy="0"/>
+        </a:xfrm>
+      </p:grpSpPr>
+      <p:sp>
+        <p:nvSpPr>
+          <p:cNvPr id="2" name="Título 1">
+            <a:extLst>
+              <a:ext uri="{FF2B5EF4-FFF2-40B4-BE49-F238E27FC236}">
+                <a16:creationId xmlns:a16="http://schemas.microsoft.com/office/drawing/2014/main" id="{DCF06C45-9BB4-409A-8D97-C31A9E8FE8F8}"/>
+              </a:ext>
+            </a:extLst>
+          </p:cNvPr>
+          <p:cNvSpPr>
+            <a:spLocks noGrp="1"/>
+          </p:cNvSpPr>
+          <p:nvPr>
+            <p:ph type="title"/>
+          </p:nvPr>
+        </p:nvSpPr>
+        <p:spPr/>
+        <p:txBody>
+          <a:bodyPr/>
+          <a:lstStyle/>
+          <a:p>
+            <a:r>
+              <a:rPr lang="pt-PT" dirty="0"/>
+              <a:t>Diagrama de Blocos</a:t>
+            </a:r>
+          </a:p>
+        </p:txBody>
+      </p:sp>
       <p:pic>
         <p:nvPicPr>
           <p:cNvPr id="25" name="Áudio 24">
@@ -5034,6 +5117,41 @@
           <a:prstGeom prst="rect">
             <a:avLst/>
           </a:prstGeom>
+        </p:spPr>
+      </p:pic>
+      <p:pic>
+        <p:nvPicPr>
+          <p:cNvPr id="6" name="Marcador de Posição de Conteúdo 5" descr="Uma imagem com captura de ecrã&#10;&#10;Descrição gerada automaticamente">
+            <a:extLst>
+              <a:ext uri="{FF2B5EF4-FFF2-40B4-BE49-F238E27FC236}">
+                <a16:creationId xmlns:a16="http://schemas.microsoft.com/office/drawing/2014/main" id="{A08CFEA7-A815-4653-B727-787C601ADA10}"/>
+              </a:ext>
+            </a:extLst>
+          </p:cNvPr>
+          <p:cNvPicPr>
+            <a:picLocks noGrp="1" noChangeAspect="1"/>
+          </p:cNvPicPr>
+          <p:nvPr>
+            <p:ph idx="1"/>
+          </p:nvPr>
+        </p:nvPicPr>
+        <p:blipFill>
+          <a:blip r:embed="rId6">
+            <a:extLst>
+              <a:ext uri="{28A0092B-C50C-407E-A947-70E740481C1C}">
+                <a14:useLocalDpi xmlns:a14="http://schemas.microsoft.com/office/drawing/2010/main" val="0"/>
+              </a:ext>
+            </a:extLst>
+          </a:blip>
+          <a:stretch>
+            <a:fillRect/>
+          </a:stretch>
+        </p:blipFill>
+        <p:spPr>
+          <a:xfrm>
+            <a:off x="2290438" y="1808382"/>
+            <a:ext cx="7109485" cy="4428028"/>
+          </a:xfrm>
         </p:spPr>
       </p:pic>
     </p:spTree>
@@ -5133,369 +5251,6 @@
                 </p:cTn>
                 <p:tgtEl>
                   <p:spTgt spid="25"/>
-                </p:tgtEl>
-              </p:cMediaNode>
-            </p:audio>
-          </p:childTnLst>
-        </p:cTn>
-      </p:par>
-    </p:tnLst>
-  </p:timing>
-</p:sld>
-</file>
-
-<file path=ppt/slides/slide4.xml><?xml version="1.0" encoding="utf-8"?>
-<p:sld xmlns:a="http://schemas.openxmlformats.org/drawingml/2006/main" xmlns:r="http://schemas.openxmlformats.org/officeDocument/2006/relationships" xmlns:p="http://schemas.openxmlformats.org/presentationml/2006/main">
-  <p:cSld>
-    <p:bg>
-      <p:bgPr>
-        <a:solidFill>
-          <a:schemeClr val="bg1"/>
-        </a:solidFill>
-        <a:effectLst/>
-      </p:bgPr>
-    </p:bg>
-    <p:spTree>
-      <p:nvGrpSpPr>
-        <p:cNvPr id="1" name=""/>
-        <p:cNvGrpSpPr/>
-        <p:nvPr/>
-      </p:nvGrpSpPr>
-      <p:grpSpPr>
-        <a:xfrm>
-          <a:off x="0" y="0"/>
-          <a:ext cx="0" cy="0"/>
-          <a:chOff x="0" y="0"/>
-          <a:chExt cx="0" cy="0"/>
-        </a:xfrm>
-      </p:grpSpPr>
-      <p:sp>
-        <p:nvSpPr>
-          <p:cNvPr id="2" name="Título 1">
-            <a:extLst>
-              <a:ext uri="{FF2B5EF4-FFF2-40B4-BE49-F238E27FC236}">
-                <a16:creationId xmlns:a16="http://schemas.microsoft.com/office/drawing/2014/main" id="{B0651113-9508-4B1C-B0A1-0AB5FE382F0E}"/>
-              </a:ext>
-            </a:extLst>
-          </p:cNvPr>
-          <p:cNvSpPr>
-            <a:spLocks noGrp="1"/>
-          </p:cNvSpPr>
-          <p:nvPr>
-            <p:ph type="title"/>
-          </p:nvPr>
-        </p:nvSpPr>
-        <p:spPr>
-          <a:xfrm>
-            <a:off x="492370" y="516835"/>
-            <a:ext cx="3366412" cy="2032401"/>
-          </a:xfrm>
-        </p:spPr>
-        <p:txBody>
-          <a:bodyPr vert="horz" lIns="91440" tIns="45720" rIns="91440" bIns="45720" rtlCol="0">
-            <a:normAutofit/>
-          </a:bodyPr>
-          <a:lstStyle/>
-          <a:p>
-            <a:r>
-              <a:rPr lang="en-US" sz="3600" dirty="0">
-                <a:solidFill>
-                  <a:srgbClr val="FFFFFF"/>
-                </a:solidFill>
-              </a:rPr>
-              <a:t>Plano de </a:t>
-            </a:r>
-            <a:r>
-              <a:rPr lang="en-US" sz="3600" dirty="0" err="1">
-                <a:solidFill>
-                  <a:srgbClr val="FFFFFF"/>
-                </a:solidFill>
-              </a:rPr>
-              <a:t>Trabalho</a:t>
-            </a:r>
-            <a:endParaRPr lang="en-US" sz="3600" dirty="0">
-              <a:solidFill>
-                <a:srgbClr val="FFFFFF"/>
-              </a:solidFill>
-            </a:endParaRPr>
-          </a:p>
-        </p:txBody>
-      </p:sp>
-      <p:sp>
-        <p:nvSpPr>
-          <p:cNvPr id="23" name="Content Placeholder 22">
-            <a:extLst>
-              <a:ext uri="{FF2B5EF4-FFF2-40B4-BE49-F238E27FC236}">
-                <a16:creationId xmlns:a16="http://schemas.microsoft.com/office/drawing/2014/main" id="{C1CE2EA0-22EB-4E40-B639-B163D21E24EA}"/>
-              </a:ext>
-            </a:extLst>
-          </p:cNvPr>
-          <p:cNvSpPr>
-            <a:spLocks noGrp="1"/>
-          </p:cNvSpPr>
-          <p:nvPr>
-            <p:ph idx="1"/>
-          </p:nvPr>
-        </p:nvSpPr>
-        <p:spPr>
-          <a:xfrm>
-            <a:off x="492371" y="2653800"/>
-            <a:ext cx="3084844" cy="3335519"/>
-          </a:xfrm>
-        </p:spPr>
-        <p:txBody>
-          <a:bodyPr>
-            <a:normAutofit/>
-          </a:bodyPr>
-          <a:lstStyle/>
-          <a:p>
-            <a:endParaRPr lang="en-US" sz="1500">
-              <a:solidFill>
-                <a:srgbClr val="FFFFFF"/>
-              </a:solidFill>
-            </a:endParaRPr>
-          </a:p>
-        </p:txBody>
-      </p:sp>
-      <p:sp>
-        <p:nvSpPr>
-          <p:cNvPr id="7" name="CaixaDeTexto 6">
-            <a:extLst>
-              <a:ext uri="{FF2B5EF4-FFF2-40B4-BE49-F238E27FC236}">
-                <a16:creationId xmlns:a16="http://schemas.microsoft.com/office/drawing/2014/main" id="{7BD16280-37B1-4E11-8098-72DF6E9249A1}"/>
-              </a:ext>
-            </a:extLst>
-          </p:cNvPr>
-          <p:cNvSpPr txBox="1"/>
-          <p:nvPr/>
-        </p:nvSpPr>
-        <p:spPr>
-          <a:xfrm>
-            <a:off x="3161579" y="265536"/>
-            <a:ext cx="5317403" cy="830997"/>
-          </a:xfrm>
-          <a:prstGeom prst="rect">
-            <a:avLst/>
-          </a:prstGeom>
-          <a:noFill/>
-        </p:spPr>
-        <p:txBody>
-          <a:bodyPr wrap="square" rtlCol="0">
-            <a:spAutoFit/>
-          </a:bodyPr>
-          <a:lstStyle/>
-          <a:p>
-            <a:r>
-              <a:rPr lang="pt-PT" sz="4800" dirty="0">
-                <a:latin typeface="Arial" panose="020B0604020202020204" pitchFamily="34" charset="0"/>
-                <a:cs typeface="Arial" panose="020B0604020202020204" pitchFamily="34" charset="0"/>
-              </a:rPr>
-              <a:t>Plano de Trabalho</a:t>
-            </a:r>
-          </a:p>
-        </p:txBody>
-      </p:sp>
-      <p:cxnSp>
-        <p:nvCxnSpPr>
-          <p:cNvPr id="9" name="Conexão reta 8">
-            <a:extLst>
-              <a:ext uri="{FF2B5EF4-FFF2-40B4-BE49-F238E27FC236}">
-                <a16:creationId xmlns:a16="http://schemas.microsoft.com/office/drawing/2014/main" id="{E9014DEB-82A5-490C-AA3B-76711D28EF3B}"/>
-              </a:ext>
-            </a:extLst>
-          </p:cNvPr>
-          <p:cNvCxnSpPr/>
-          <p:nvPr/>
-        </p:nvCxnSpPr>
-        <p:spPr>
-          <a:xfrm>
-            <a:off x="92364" y="1096533"/>
-            <a:ext cx="11274136" cy="0"/>
-          </a:xfrm>
-          <a:prstGeom prst="line">
-            <a:avLst/>
-          </a:prstGeom>
-        </p:spPr>
-        <p:style>
-          <a:lnRef idx="1">
-            <a:schemeClr val="accent1"/>
-          </a:lnRef>
-          <a:fillRef idx="0">
-            <a:schemeClr val="accent1"/>
-          </a:fillRef>
-          <a:effectRef idx="0">
-            <a:schemeClr val="accent1"/>
-          </a:effectRef>
-          <a:fontRef idx="minor">
-            <a:schemeClr val="tx1"/>
-          </a:fontRef>
-        </p:style>
-      </p:cxnSp>
-      <p:pic>
-        <p:nvPicPr>
-          <p:cNvPr id="3" name="Imagem 2">
-            <a:extLst>
-              <a:ext uri="{FF2B5EF4-FFF2-40B4-BE49-F238E27FC236}">
-                <a16:creationId xmlns:a16="http://schemas.microsoft.com/office/drawing/2014/main" id="{1182ACDA-B609-4A88-B238-76BE79A82324}"/>
-              </a:ext>
-            </a:extLst>
-          </p:cNvPr>
-          <p:cNvPicPr>
-            <a:picLocks noChangeAspect="1"/>
-          </p:cNvPicPr>
-          <p:nvPr/>
-        </p:nvPicPr>
-        <p:blipFill>
-          <a:blip r:embed="rId5"/>
-          <a:stretch>
-            <a:fillRect/>
-          </a:stretch>
-        </p:blipFill>
-        <p:spPr>
-          <a:xfrm>
-            <a:off x="0" y="1000614"/>
-            <a:ext cx="12192000" cy="4856772"/>
-          </a:xfrm>
-          <a:prstGeom prst="rect">
-            <a:avLst/>
-          </a:prstGeom>
-        </p:spPr>
-      </p:pic>
-      <p:pic>
-        <p:nvPicPr>
-          <p:cNvPr id="8" name="Áudio 7">
-            <a:hlinkClick r:id="" action="ppaction://media"/>
-            <a:extLst>
-              <a:ext uri="{FF2B5EF4-FFF2-40B4-BE49-F238E27FC236}">
-                <a16:creationId xmlns:a16="http://schemas.microsoft.com/office/drawing/2014/main" id="{DC42CDC7-B566-4748-8B04-0B76DFC883A2}"/>
-              </a:ext>
-            </a:extLst>
-          </p:cNvPr>
-          <p:cNvPicPr>
-            <a:picLocks noChangeAspect="1"/>
-          </p:cNvPicPr>
-          <p:nvPr>
-            <a:audioFile r:link="rId2"/>
-            <p:extLst>
-              <p:ext uri="{DAA4B4D4-6D71-4841-9C94-3DE7FCFB9230}">
-                <p14:media xmlns:p14="http://schemas.microsoft.com/office/powerpoint/2010/main" r:embed="rId1"/>
-              </p:ext>
-            </p:extLst>
-          </p:nvPr>
-        </p:nvPicPr>
-        <p:blipFill>
-          <a:blip r:embed="rId6"/>
-          <a:stretch>
-            <a:fillRect/>
-          </a:stretch>
-        </p:blipFill>
-        <p:spPr>
-          <a:xfrm>
-            <a:off x="11366500" y="6032500"/>
-            <a:ext cx="609600" cy="609600"/>
-          </a:xfrm>
-          <a:prstGeom prst="rect">
-            <a:avLst/>
-          </a:prstGeom>
-        </p:spPr>
-      </p:pic>
-    </p:spTree>
-    <p:extLst>
-      <p:ext uri="{BB962C8B-B14F-4D97-AF65-F5344CB8AC3E}">
-        <p14:creationId xmlns:p14="http://schemas.microsoft.com/office/powerpoint/2010/main" val="32653899"/>
-      </p:ext>
-    </p:extLst>
-  </p:cSld>
-  <p:clrMapOvr>
-    <a:masterClrMapping/>
-  </p:clrMapOvr>
-  <mc:AlternateContent xmlns:mc="http://schemas.openxmlformats.org/markup-compatibility/2006">
-    <mc:Choice xmlns:p14="http://schemas.microsoft.com/office/powerpoint/2010/main" Requires="p14">
-      <p:transition spd="slow" p14:dur="2000" advTm="34278"/>
-    </mc:Choice>
-    <mc:Fallback>
-      <p:transition spd="slow" advTm="34278"/>
-    </mc:Fallback>
-  </mc:AlternateContent>
-  <p:timing>
-    <p:tnLst>
-      <p:par>
-        <p:cTn id="1" dur="indefinite" restart="never" nodeType="tmRoot">
-          <p:childTnLst>
-            <p:seq concurrent="1" nextAc="seek">
-              <p:cTn id="2" dur="indefinite" nodeType="mainSeq">
-                <p:childTnLst>
-                  <p:par>
-                    <p:cTn id="3" fill="hold">
-                      <p:stCondLst>
-                        <p:cond delay="indefinite"/>
-                        <p:cond evt="onBegin" delay="0">
-                          <p:tn val="2"/>
-                        </p:cond>
-                      </p:stCondLst>
-                      <p:childTnLst>
-                        <p:par>
-                          <p:cTn id="4" fill="hold">
-                            <p:stCondLst>
-                              <p:cond delay="0"/>
-                            </p:stCondLst>
-                            <p:childTnLst>
-                              <p:par>
-                                <p:cTn id="5" presetID="1" presetClass="mediacall" presetSubtype="0" fill="hold" nodeType="afterEffect">
-                                  <p:stCondLst>
-                                    <p:cond delay="0"/>
-                                  </p:stCondLst>
-                                  <p:childTnLst>
-                                    <p:cmd type="call" cmd="playFrom(0.0)">
-                                      <p:cBhvr>
-                                        <p:cTn id="6" dur="1" fill="hold"/>
-                                        <p:tgtEl>
-                                          <p:spTgt spid="8"/>
-                                        </p:tgtEl>
-                                      </p:cBhvr>
-                                    </p:cmd>
-                                  </p:childTnLst>
-                                </p:cTn>
-                              </p:par>
-                            </p:childTnLst>
-                          </p:cTn>
-                        </p:par>
-                      </p:childTnLst>
-                    </p:cTn>
-                  </p:par>
-                </p:childTnLst>
-              </p:cTn>
-              <p:prevCondLst>
-                <p:cond evt="onPrev" delay="0">
-                  <p:tgtEl>
-                    <p:sldTgt/>
-                  </p:tgtEl>
-                </p:cond>
-              </p:prevCondLst>
-              <p:nextCondLst>
-                <p:cond evt="onNext" delay="0">
-                  <p:tgtEl>
-                    <p:sldTgt/>
-                  </p:tgtEl>
-                </p:cond>
-              </p:nextCondLst>
-            </p:seq>
-            <p:audio isNarration="1">
-              <p:cMediaNode vol="80000" showWhenStopped="0">
-                <p:cTn id="7" fill="hold" display="0">
-                  <p:stCondLst>
-                    <p:cond delay="indefinite"/>
-                  </p:stCondLst>
-                  <p:endCondLst>
-                    <p:cond evt="onStopAudio" delay="0">
-                      <p:tgtEl>
-                        <p:sldTgt/>
-                      </p:tgtEl>
-                    </p:cond>
-                  </p:endCondLst>
-                </p:cTn>
-                <p:tgtEl>
-                  <p:spTgt spid="8"/>
                 </p:tgtEl>
               </p:cMediaNode>
             </p:audio>

</xml_diff>